<commit_message>
Reconciling three videos for module09 in Clinical Research Methods
</commit_message>
<xml_diff>
--- a/clinical-research-methodology/results/video01-introduction.pptx
+++ b/clinical-research-methodology/results/video01-introduction.pptx
@@ -227,7 +227,7 @@
           <a:p>
             <a:fld id="{0F9C1CCF-B725-44A7-AA57-5E433BD85C9F}" type="datetimeFigureOut">
               <a:rPr lang="en-US" smtClean="0"/>
-              <a:t>12/30/2018</a:t>
+              <a:t>4/5/2019</a:t>
             </a:fld>
             <a:endParaRPr lang="en-US"/>
           </a:p>
@@ -291,37 +291,38 @@
           <a:p>
             <a:pPr lvl="0"/>
             <a:r>
-              <a:rPr lang="en-US"/>
+              <a:rPr lang="en-US" smtClean="0"/>
               <a:t>Click to edit Master text styles</a:t>
             </a:r>
           </a:p>
           <a:p>
             <a:pPr lvl="1"/>
             <a:r>
-              <a:rPr lang="en-US"/>
+              <a:rPr lang="en-US" smtClean="0"/>
               <a:t>Second level</a:t>
             </a:r>
           </a:p>
           <a:p>
             <a:pPr lvl="2"/>
             <a:r>
-              <a:rPr lang="en-US"/>
+              <a:rPr lang="en-US" smtClean="0"/>
               <a:t>Third level</a:t>
             </a:r>
           </a:p>
           <a:p>
             <a:pPr lvl="3"/>
             <a:r>
-              <a:rPr lang="en-US"/>
+              <a:rPr lang="en-US" smtClean="0"/>
               <a:t>Fourth level</a:t>
             </a:r>
           </a:p>
           <a:p>
             <a:pPr lvl="4"/>
             <a:r>
-              <a:rPr lang="en-US"/>
+              <a:rPr lang="en-US" smtClean="0"/>
               <a:t>Fifth level</a:t>
             </a:r>
+            <a:endParaRPr lang="en-US"/>
           </a:p>
         </p:txBody>
       </p:sp>
@@ -21558,9 +21559,10 @@
           <a:lstStyle/>
           <a:p>
             <a:r>
-              <a:rPr lang="en-US"/>
+              <a:rPr lang="en-US" smtClean="0"/>
               <a:t>Click to edit Master title style</a:t>
             </a:r>
+            <a:endParaRPr lang="en-US"/>
           </a:p>
         </p:txBody>
       </p:sp>
@@ -21676,9 +21678,10 @@
           </a:lstStyle>
           <a:p>
             <a:r>
-              <a:rPr lang="en-US"/>
+              <a:rPr lang="en-US" smtClean="0"/>
               <a:t>Click to edit Master subtitle style</a:t>
             </a:r>
+            <a:endParaRPr lang="en-US"/>
           </a:p>
         </p:txBody>
       </p:sp>
@@ -21699,7 +21702,7 @@
           <a:p>
             <a:fld id="{241EB5C9-1307-BA42-ABA2-0BC069CD8E7F}" type="datetimeFigureOut">
               <a:rPr lang="en-US" smtClean="0"/>
-              <a:t>12/30/2018</a:t>
+              <a:t>4/5/2019</a:t>
             </a:fld>
             <a:endParaRPr lang="en-US"/>
           </a:p>
@@ -21793,9 +21796,10 @@
           <a:lstStyle/>
           <a:p>
             <a:r>
-              <a:rPr lang="en-US"/>
+              <a:rPr lang="en-US" smtClean="0"/>
               <a:t>Click to edit Master title style</a:t>
             </a:r>
+            <a:endParaRPr lang="en-US"/>
           </a:p>
         </p:txBody>
       </p:sp>
@@ -21816,37 +21820,38 @@
           <a:p>
             <a:pPr lvl="0"/>
             <a:r>
-              <a:rPr lang="en-US"/>
+              <a:rPr lang="en-US" smtClean="0"/>
               <a:t>Click to edit Master text styles</a:t>
             </a:r>
           </a:p>
           <a:p>
             <a:pPr lvl="1"/>
             <a:r>
-              <a:rPr lang="en-US"/>
+              <a:rPr lang="en-US" smtClean="0"/>
               <a:t>Second level</a:t>
             </a:r>
           </a:p>
           <a:p>
             <a:pPr lvl="2"/>
             <a:r>
-              <a:rPr lang="en-US"/>
+              <a:rPr lang="en-US" smtClean="0"/>
               <a:t>Third level</a:t>
             </a:r>
           </a:p>
           <a:p>
             <a:pPr lvl="3"/>
             <a:r>
-              <a:rPr lang="en-US"/>
+              <a:rPr lang="en-US" smtClean="0"/>
               <a:t>Fourth level</a:t>
             </a:r>
           </a:p>
           <a:p>
             <a:pPr lvl="4"/>
             <a:r>
-              <a:rPr lang="en-US"/>
+              <a:rPr lang="en-US" smtClean="0"/>
               <a:t>Fifth level</a:t>
             </a:r>
+            <a:endParaRPr lang="en-US"/>
           </a:p>
         </p:txBody>
       </p:sp>
@@ -21867,7 +21872,7 @@
           <a:p>
             <a:fld id="{241EB5C9-1307-BA42-ABA2-0BC069CD8E7F}" type="datetimeFigureOut">
               <a:rPr lang="en-US" smtClean="0"/>
-              <a:t>12/30/2018</a:t>
+              <a:t>4/5/2019</a:t>
             </a:fld>
             <a:endParaRPr lang="en-US"/>
           </a:p>
@@ -21966,9 +21971,10 @@
           <a:lstStyle/>
           <a:p>
             <a:r>
-              <a:rPr lang="en-US"/>
+              <a:rPr lang="en-US" smtClean="0"/>
               <a:t>Click to edit Master title style</a:t>
             </a:r>
+            <a:endParaRPr lang="en-US"/>
           </a:p>
         </p:txBody>
       </p:sp>
@@ -21994,37 +22000,38 @@
           <a:p>
             <a:pPr lvl="0"/>
             <a:r>
-              <a:rPr lang="en-US"/>
+              <a:rPr lang="en-US" smtClean="0"/>
               <a:t>Click to edit Master text styles</a:t>
             </a:r>
           </a:p>
           <a:p>
             <a:pPr lvl="1"/>
             <a:r>
-              <a:rPr lang="en-US"/>
+              <a:rPr lang="en-US" smtClean="0"/>
               <a:t>Second level</a:t>
             </a:r>
           </a:p>
           <a:p>
             <a:pPr lvl="2"/>
             <a:r>
-              <a:rPr lang="en-US"/>
+              <a:rPr lang="en-US" smtClean="0"/>
               <a:t>Third level</a:t>
             </a:r>
           </a:p>
           <a:p>
             <a:pPr lvl="3"/>
             <a:r>
-              <a:rPr lang="en-US"/>
+              <a:rPr lang="en-US" smtClean="0"/>
               <a:t>Fourth level</a:t>
             </a:r>
           </a:p>
           <a:p>
             <a:pPr lvl="4"/>
             <a:r>
-              <a:rPr lang="en-US"/>
+              <a:rPr lang="en-US" smtClean="0"/>
               <a:t>Fifth level</a:t>
             </a:r>
+            <a:endParaRPr lang="en-US"/>
           </a:p>
         </p:txBody>
       </p:sp>
@@ -22045,7 +22052,7 @@
           <a:p>
             <a:fld id="{241EB5C9-1307-BA42-ABA2-0BC069CD8E7F}" type="datetimeFigureOut">
               <a:rPr lang="en-US" smtClean="0"/>
-              <a:t>12/30/2018</a:t>
+              <a:t>4/5/2019</a:t>
             </a:fld>
             <a:endParaRPr lang="en-US"/>
           </a:p>
@@ -22139,9 +22146,10 @@
           <a:lstStyle/>
           <a:p>
             <a:r>
-              <a:rPr lang="en-US"/>
+              <a:rPr lang="en-US" smtClean="0"/>
               <a:t>Click to edit Master title style</a:t>
             </a:r>
+            <a:endParaRPr lang="en-US"/>
           </a:p>
         </p:txBody>
       </p:sp>
@@ -22162,37 +22170,38 @@
           <a:p>
             <a:pPr lvl="0"/>
             <a:r>
-              <a:rPr lang="en-US"/>
+              <a:rPr lang="en-US" smtClean="0"/>
               <a:t>Click to edit Master text styles</a:t>
             </a:r>
           </a:p>
           <a:p>
             <a:pPr lvl="1"/>
             <a:r>
-              <a:rPr lang="en-US"/>
+              <a:rPr lang="en-US" smtClean="0"/>
               <a:t>Second level</a:t>
             </a:r>
           </a:p>
           <a:p>
             <a:pPr lvl="2"/>
             <a:r>
-              <a:rPr lang="en-US"/>
+              <a:rPr lang="en-US" smtClean="0"/>
               <a:t>Third level</a:t>
             </a:r>
           </a:p>
           <a:p>
             <a:pPr lvl="3"/>
             <a:r>
-              <a:rPr lang="en-US"/>
+              <a:rPr lang="en-US" smtClean="0"/>
               <a:t>Fourth level</a:t>
             </a:r>
           </a:p>
           <a:p>
             <a:pPr lvl="4"/>
             <a:r>
-              <a:rPr lang="en-US"/>
+              <a:rPr lang="en-US" smtClean="0"/>
               <a:t>Fifth level</a:t>
             </a:r>
+            <a:endParaRPr lang="en-US"/>
           </a:p>
         </p:txBody>
       </p:sp>
@@ -22213,7 +22222,7 @@
           <a:p>
             <a:fld id="{241EB5C9-1307-BA42-ABA2-0BC069CD8E7F}" type="datetimeFigureOut">
               <a:rPr lang="en-US" smtClean="0"/>
-              <a:t>12/30/2018</a:t>
+              <a:t>4/5/2019</a:t>
             </a:fld>
             <a:endParaRPr lang="en-US"/>
           </a:p>
@@ -22316,9 +22325,10 @@
           </a:lstStyle>
           <a:p>
             <a:r>
-              <a:rPr lang="en-US"/>
+              <a:rPr lang="en-US" smtClean="0"/>
               <a:t>Click to edit Master title style</a:t>
             </a:r>
+            <a:endParaRPr lang="en-US"/>
           </a:p>
         </p:txBody>
       </p:sp>
@@ -22435,7 +22445,7 @@
           <a:p>
             <a:pPr lvl="0"/>
             <a:r>
-              <a:rPr lang="en-US"/>
+              <a:rPr lang="en-US" smtClean="0"/>
               <a:t>Click to edit Master text styles</a:t>
             </a:r>
           </a:p>
@@ -22458,7 +22468,7 @@
           <a:p>
             <a:fld id="{241EB5C9-1307-BA42-ABA2-0BC069CD8E7F}" type="datetimeFigureOut">
               <a:rPr lang="en-US" smtClean="0"/>
-              <a:t>12/30/2018</a:t>
+              <a:t>4/5/2019</a:t>
             </a:fld>
             <a:endParaRPr lang="en-US"/>
           </a:p>
@@ -22552,9 +22562,10 @@
           <a:lstStyle/>
           <a:p>
             <a:r>
-              <a:rPr lang="en-US"/>
+              <a:rPr lang="en-US" smtClean="0"/>
               <a:t>Click to edit Master title style</a:t>
             </a:r>
+            <a:endParaRPr lang="en-US"/>
           </a:p>
         </p:txBody>
       </p:sp>
@@ -22608,37 +22619,38 @@
           <a:p>
             <a:pPr lvl="0"/>
             <a:r>
-              <a:rPr lang="en-US"/>
+              <a:rPr lang="en-US" smtClean="0"/>
               <a:t>Click to edit Master text styles</a:t>
             </a:r>
           </a:p>
           <a:p>
             <a:pPr lvl="1"/>
             <a:r>
-              <a:rPr lang="en-US"/>
+              <a:rPr lang="en-US" smtClean="0"/>
               <a:t>Second level</a:t>
             </a:r>
           </a:p>
           <a:p>
             <a:pPr lvl="2"/>
             <a:r>
-              <a:rPr lang="en-US"/>
+              <a:rPr lang="en-US" smtClean="0"/>
               <a:t>Third level</a:t>
             </a:r>
           </a:p>
           <a:p>
             <a:pPr lvl="3"/>
             <a:r>
-              <a:rPr lang="en-US"/>
+              <a:rPr lang="en-US" smtClean="0"/>
               <a:t>Fourth level</a:t>
             </a:r>
           </a:p>
           <a:p>
             <a:pPr lvl="4"/>
             <a:r>
-              <a:rPr lang="en-US"/>
+              <a:rPr lang="en-US" smtClean="0"/>
               <a:t>Fifth level</a:t>
             </a:r>
+            <a:endParaRPr lang="en-US"/>
           </a:p>
         </p:txBody>
       </p:sp>
@@ -22692,37 +22704,38 @@
           <a:p>
             <a:pPr lvl="0"/>
             <a:r>
-              <a:rPr lang="en-US"/>
+              <a:rPr lang="en-US" smtClean="0"/>
               <a:t>Click to edit Master text styles</a:t>
             </a:r>
           </a:p>
           <a:p>
             <a:pPr lvl="1"/>
             <a:r>
-              <a:rPr lang="en-US"/>
+              <a:rPr lang="en-US" smtClean="0"/>
               <a:t>Second level</a:t>
             </a:r>
           </a:p>
           <a:p>
             <a:pPr lvl="2"/>
             <a:r>
-              <a:rPr lang="en-US"/>
+              <a:rPr lang="en-US" smtClean="0"/>
               <a:t>Third level</a:t>
             </a:r>
           </a:p>
           <a:p>
             <a:pPr lvl="3"/>
             <a:r>
-              <a:rPr lang="en-US"/>
+              <a:rPr lang="en-US" smtClean="0"/>
               <a:t>Fourth level</a:t>
             </a:r>
           </a:p>
           <a:p>
             <a:pPr lvl="4"/>
             <a:r>
-              <a:rPr lang="en-US"/>
+              <a:rPr lang="en-US" smtClean="0"/>
               <a:t>Fifth level</a:t>
             </a:r>
+            <a:endParaRPr lang="en-US"/>
           </a:p>
         </p:txBody>
       </p:sp>
@@ -22743,7 +22756,7 @@
           <a:p>
             <a:fld id="{241EB5C9-1307-BA42-ABA2-0BC069CD8E7F}" type="datetimeFigureOut">
               <a:rPr lang="en-US" smtClean="0"/>
-              <a:t>12/30/2018</a:t>
+              <a:t>4/5/2019</a:t>
             </a:fld>
             <a:endParaRPr lang="en-US"/>
           </a:p>
@@ -22841,9 +22854,10 @@
           </a:lstStyle>
           <a:p>
             <a:r>
-              <a:rPr lang="en-US"/>
+              <a:rPr lang="en-US" smtClean="0"/>
               <a:t>Click to edit Master title style</a:t>
             </a:r>
+            <a:endParaRPr lang="en-US"/>
           </a:p>
         </p:txBody>
       </p:sp>
@@ -22906,7 +22920,7 @@
           <a:p>
             <a:pPr lvl="0"/>
             <a:r>
-              <a:rPr lang="en-US"/>
+              <a:rPr lang="en-US" smtClean="0"/>
               <a:t>Click to edit Master text styles</a:t>
             </a:r>
           </a:p>
@@ -22962,37 +22976,38 @@
           <a:p>
             <a:pPr lvl="0"/>
             <a:r>
-              <a:rPr lang="en-US"/>
+              <a:rPr lang="en-US" smtClean="0"/>
               <a:t>Click to edit Master text styles</a:t>
             </a:r>
           </a:p>
           <a:p>
             <a:pPr lvl="1"/>
             <a:r>
-              <a:rPr lang="en-US"/>
+              <a:rPr lang="en-US" smtClean="0"/>
               <a:t>Second level</a:t>
             </a:r>
           </a:p>
           <a:p>
             <a:pPr lvl="2"/>
             <a:r>
-              <a:rPr lang="en-US"/>
+              <a:rPr lang="en-US" smtClean="0"/>
               <a:t>Third level</a:t>
             </a:r>
           </a:p>
           <a:p>
             <a:pPr lvl="3"/>
             <a:r>
-              <a:rPr lang="en-US"/>
+              <a:rPr lang="en-US" smtClean="0"/>
               <a:t>Fourth level</a:t>
             </a:r>
           </a:p>
           <a:p>
             <a:pPr lvl="4"/>
             <a:r>
-              <a:rPr lang="en-US"/>
+              <a:rPr lang="en-US" smtClean="0"/>
               <a:t>Fifth level</a:t>
             </a:r>
+            <a:endParaRPr lang="en-US"/>
           </a:p>
         </p:txBody>
       </p:sp>
@@ -23055,7 +23070,7 @@
           <a:p>
             <a:pPr lvl="0"/>
             <a:r>
-              <a:rPr lang="en-US"/>
+              <a:rPr lang="en-US" smtClean="0"/>
               <a:t>Click to edit Master text styles</a:t>
             </a:r>
           </a:p>
@@ -23111,37 +23126,38 @@
           <a:p>
             <a:pPr lvl="0"/>
             <a:r>
-              <a:rPr lang="en-US"/>
+              <a:rPr lang="en-US" smtClean="0"/>
               <a:t>Click to edit Master text styles</a:t>
             </a:r>
           </a:p>
           <a:p>
             <a:pPr lvl="1"/>
             <a:r>
-              <a:rPr lang="en-US"/>
+              <a:rPr lang="en-US" smtClean="0"/>
               <a:t>Second level</a:t>
             </a:r>
           </a:p>
           <a:p>
             <a:pPr lvl="2"/>
             <a:r>
-              <a:rPr lang="en-US"/>
+              <a:rPr lang="en-US" smtClean="0"/>
               <a:t>Third level</a:t>
             </a:r>
           </a:p>
           <a:p>
             <a:pPr lvl="3"/>
             <a:r>
-              <a:rPr lang="en-US"/>
+              <a:rPr lang="en-US" smtClean="0"/>
               <a:t>Fourth level</a:t>
             </a:r>
           </a:p>
           <a:p>
             <a:pPr lvl="4"/>
             <a:r>
-              <a:rPr lang="en-US"/>
+              <a:rPr lang="en-US" smtClean="0"/>
               <a:t>Fifth level</a:t>
             </a:r>
+            <a:endParaRPr lang="en-US"/>
           </a:p>
         </p:txBody>
       </p:sp>
@@ -23162,7 +23178,7 @@
           <a:p>
             <a:fld id="{241EB5C9-1307-BA42-ABA2-0BC069CD8E7F}" type="datetimeFigureOut">
               <a:rPr lang="en-US" smtClean="0"/>
-              <a:t>12/30/2018</a:t>
+              <a:t>4/5/2019</a:t>
             </a:fld>
             <a:endParaRPr lang="en-US"/>
           </a:p>
@@ -23256,9 +23272,10 @@
           <a:lstStyle/>
           <a:p>
             <a:r>
-              <a:rPr lang="en-US"/>
+              <a:rPr lang="en-US" smtClean="0"/>
               <a:t>Click to edit Master title style</a:t>
             </a:r>
+            <a:endParaRPr lang="en-US"/>
           </a:p>
         </p:txBody>
       </p:sp>
@@ -23279,7 +23296,7 @@
           <a:p>
             <a:fld id="{241EB5C9-1307-BA42-ABA2-0BC069CD8E7F}" type="datetimeFigureOut">
               <a:rPr lang="en-US" smtClean="0"/>
-              <a:t>12/30/2018</a:t>
+              <a:t>4/5/2019</a:t>
             </a:fld>
             <a:endParaRPr lang="en-US"/>
           </a:p>
@@ -23374,7 +23391,7 @@
           <a:p>
             <a:fld id="{241EB5C9-1307-BA42-ABA2-0BC069CD8E7F}" type="datetimeFigureOut">
               <a:rPr lang="en-US" smtClean="0"/>
-              <a:t>12/30/2018</a:t>
+              <a:t>4/5/2019</a:t>
             </a:fld>
             <a:endParaRPr lang="en-US"/>
           </a:p>
@@ -23477,9 +23494,10 @@
           </a:lstStyle>
           <a:p>
             <a:r>
-              <a:rPr lang="en-US"/>
+              <a:rPr lang="en-US" smtClean="0"/>
               <a:t>Click to edit Master title style</a:t>
             </a:r>
+            <a:endParaRPr lang="en-US"/>
           </a:p>
         </p:txBody>
       </p:sp>
@@ -23533,37 +23551,38 @@
           <a:p>
             <a:pPr lvl="0"/>
             <a:r>
-              <a:rPr lang="en-US"/>
+              <a:rPr lang="en-US" smtClean="0"/>
               <a:t>Click to edit Master text styles</a:t>
             </a:r>
           </a:p>
           <a:p>
             <a:pPr lvl="1"/>
             <a:r>
-              <a:rPr lang="en-US"/>
+              <a:rPr lang="en-US" smtClean="0"/>
               <a:t>Second level</a:t>
             </a:r>
           </a:p>
           <a:p>
             <a:pPr lvl="2"/>
             <a:r>
-              <a:rPr lang="en-US"/>
+              <a:rPr lang="en-US" smtClean="0"/>
               <a:t>Third level</a:t>
             </a:r>
           </a:p>
           <a:p>
             <a:pPr lvl="3"/>
             <a:r>
-              <a:rPr lang="en-US"/>
+              <a:rPr lang="en-US" smtClean="0"/>
               <a:t>Fourth level</a:t>
             </a:r>
           </a:p>
           <a:p>
             <a:pPr lvl="4"/>
             <a:r>
-              <a:rPr lang="en-US"/>
+              <a:rPr lang="en-US" smtClean="0"/>
               <a:t>Fifth level</a:t>
             </a:r>
+            <a:endParaRPr lang="en-US"/>
           </a:p>
         </p:txBody>
       </p:sp>
@@ -23626,7 +23645,7 @@
           <a:p>
             <a:pPr lvl="0"/>
             <a:r>
-              <a:rPr lang="en-US"/>
+              <a:rPr lang="en-US" smtClean="0"/>
               <a:t>Click to edit Master text styles</a:t>
             </a:r>
           </a:p>
@@ -23649,7 +23668,7 @@
           <a:p>
             <a:fld id="{241EB5C9-1307-BA42-ABA2-0BC069CD8E7F}" type="datetimeFigureOut">
               <a:rPr lang="en-US" smtClean="0"/>
-              <a:t>12/30/2018</a:t>
+              <a:t>4/5/2019</a:t>
             </a:fld>
             <a:endParaRPr lang="en-US"/>
           </a:p>
@@ -23752,9 +23771,10 @@
           </a:lstStyle>
           <a:p>
             <a:r>
-              <a:rPr lang="en-US"/>
+              <a:rPr lang="en-US" smtClean="0"/>
               <a:t>Click to edit Master title style</a:t>
             </a:r>
+            <a:endParaRPr lang="en-US"/>
           </a:p>
         </p:txBody>
       </p:sp>
@@ -23878,7 +23898,7 @@
           <a:p>
             <a:pPr lvl="0"/>
             <a:r>
-              <a:rPr lang="en-US"/>
+              <a:rPr lang="en-US" smtClean="0"/>
               <a:t>Click to edit Master text styles</a:t>
             </a:r>
           </a:p>
@@ -23901,7 +23921,7 @@
           <a:p>
             <a:fld id="{241EB5C9-1307-BA42-ABA2-0BC069CD8E7F}" type="datetimeFigureOut">
               <a:rPr lang="en-US" smtClean="0"/>
-              <a:t>12/30/2018</a:t>
+              <a:t>4/5/2019</a:t>
             </a:fld>
             <a:endParaRPr lang="en-US"/>
           </a:p>
@@ -24010,9 +24030,10 @@
           <a:lstStyle/>
           <a:p>
             <a:r>
-              <a:rPr lang="en-US"/>
+              <a:rPr lang="en-US" smtClean="0"/>
               <a:t>Click to edit Master title style</a:t>
             </a:r>
+            <a:endParaRPr lang="en-US"/>
           </a:p>
         </p:txBody>
       </p:sp>
@@ -24043,37 +24064,38 @@
           <a:p>
             <a:pPr lvl="0"/>
             <a:r>
-              <a:rPr lang="en-US"/>
+              <a:rPr lang="en-US" smtClean="0"/>
               <a:t>Click to edit Master text styles</a:t>
             </a:r>
           </a:p>
           <a:p>
             <a:pPr lvl="1"/>
             <a:r>
-              <a:rPr lang="en-US"/>
+              <a:rPr lang="en-US" smtClean="0"/>
               <a:t>Second level</a:t>
             </a:r>
           </a:p>
           <a:p>
             <a:pPr lvl="2"/>
             <a:r>
-              <a:rPr lang="en-US"/>
+              <a:rPr lang="en-US" smtClean="0"/>
               <a:t>Third level</a:t>
             </a:r>
           </a:p>
           <a:p>
             <a:pPr lvl="3"/>
             <a:r>
-              <a:rPr lang="en-US"/>
+              <a:rPr lang="en-US" smtClean="0"/>
               <a:t>Fourth level</a:t>
             </a:r>
           </a:p>
           <a:p>
             <a:pPr lvl="4"/>
             <a:r>
-              <a:rPr lang="en-US"/>
+              <a:rPr lang="en-US" smtClean="0"/>
               <a:t>Fifth level</a:t>
             </a:r>
+            <a:endParaRPr lang="en-US"/>
           </a:p>
         </p:txBody>
       </p:sp>
@@ -24112,7 +24134,7 @@
           <a:p>
             <a:fld id="{241EB5C9-1307-BA42-ABA2-0BC069CD8E7F}" type="datetimeFigureOut">
               <a:rPr lang="en-US" smtClean="0"/>
-              <a:t>12/30/2018</a:t>
+              <a:t>4/5/2019</a:t>
             </a:fld>
             <a:endParaRPr lang="en-US"/>
           </a:p>

</xml_diff>